<commit_message>
inserted short intro into demos and started stm demo
</commit_message>
<xml_diff>
--- a/5_seminar/Contents_Part_02/slides/slides_II_2.pptx
+++ b/5_seminar/Contents_Part_02/slides/slides_II_2.pptx
@@ -5,7 +5,7 @@
     <p:sldMasterId id="2147483648" r:id="rId1"/>
   </p:sldMasterIdLst>
   <p:notesMasterIdLst>
-    <p:notesMasterId r:id="rId16"/>
+    <p:notesMasterId r:id="rId17"/>
   </p:notesMasterIdLst>
   <p:sldIdLst>
     <p:sldId id="303" r:id="rId2"/>
@@ -16,12 +16,13 @@
     <p:sldId id="347" r:id="rId7"/>
     <p:sldId id="333" r:id="rId8"/>
     <p:sldId id="311" r:id="rId9"/>
-    <p:sldId id="336" r:id="rId10"/>
-    <p:sldId id="334" r:id="rId11"/>
-    <p:sldId id="348" r:id="rId12"/>
-    <p:sldId id="335" r:id="rId13"/>
-    <p:sldId id="331" r:id="rId14"/>
-    <p:sldId id="274" r:id="rId15"/>
+    <p:sldId id="349" r:id="rId10"/>
+    <p:sldId id="336" r:id="rId11"/>
+    <p:sldId id="334" r:id="rId12"/>
+    <p:sldId id="348" r:id="rId13"/>
+    <p:sldId id="335" r:id="rId14"/>
+    <p:sldId id="331" r:id="rId15"/>
+    <p:sldId id="274" r:id="rId16"/>
   </p:sldIdLst>
   <p:sldSz cx="12192000" cy="6858000"/>
   <p:notesSz cx="6858000" cy="9144000"/>
@@ -956,7 +957,7 @@
     </p:spTree>
     <p:extLst>
       <p:ext uri="{BB962C8B-B14F-4D97-AF65-F5344CB8AC3E}">
-        <p14:creationId xmlns:p14="http://schemas.microsoft.com/office/powerpoint/2010/main" val="4272284150"/>
+        <p14:creationId xmlns:p14="http://schemas.microsoft.com/office/powerpoint/2010/main" val="244738309"/>
       </p:ext>
     </p:extLst>
   </p:cSld>
@@ -1048,7 +1049,7 @@
           <a:p>
             <a:fld id="{20A41429-B750-4047-B563-2878417A70E7}" type="slidenum">
               <a:rPr lang="en-US" smtClean="0"/>
-              <a:t>11</a:t>
+              <a:t>10</a:t>
             </a:fld>
             <a:endParaRPr lang="en-US"/>
           </a:p>
@@ -1057,7 +1058,7 @@
     </p:spTree>
     <p:extLst>
       <p:ext uri="{BB962C8B-B14F-4D97-AF65-F5344CB8AC3E}">
-        <p14:creationId xmlns:p14="http://schemas.microsoft.com/office/powerpoint/2010/main" val="2003840370"/>
+        <p14:creationId xmlns:p14="http://schemas.microsoft.com/office/powerpoint/2010/main" val="4272284150"/>
       </p:ext>
     </p:extLst>
   </p:cSld>
@@ -1150,6 +1151,107 @@
             <a:fld id="{20A41429-B750-4047-B563-2878417A70E7}" type="slidenum">
               <a:rPr lang="en-US" smtClean="0"/>
               <a:t>12</a:t>
+            </a:fld>
+            <a:endParaRPr lang="en-US"/>
+          </a:p>
+        </p:txBody>
+      </p:sp>
+    </p:spTree>
+    <p:extLst>
+      <p:ext uri="{BB962C8B-B14F-4D97-AF65-F5344CB8AC3E}">
+        <p14:creationId xmlns:p14="http://schemas.microsoft.com/office/powerpoint/2010/main" val="2003840370"/>
+      </p:ext>
+    </p:extLst>
+  </p:cSld>
+  <p:clrMapOvr>
+    <a:masterClrMapping/>
+  </p:clrMapOvr>
+</p:notes>
+</file>
+
+<file path=ppt/notesSlides/notesSlide8.xml><?xml version="1.0" encoding="utf-8"?>
+<p:notes xmlns:a="http://schemas.openxmlformats.org/drawingml/2006/main" xmlns:r="http://schemas.openxmlformats.org/officeDocument/2006/relationships" xmlns:p="http://schemas.openxmlformats.org/presentationml/2006/main">
+  <p:cSld>
+    <p:spTree>
+      <p:nvGrpSpPr>
+        <p:cNvPr id="1" name=""/>
+        <p:cNvGrpSpPr/>
+        <p:nvPr/>
+      </p:nvGrpSpPr>
+      <p:grpSpPr>
+        <a:xfrm>
+          <a:off x="0" y="0"/>
+          <a:ext cx="0" cy="0"/>
+          <a:chOff x="0" y="0"/>
+          <a:chExt cx="0" cy="0"/>
+        </a:xfrm>
+      </p:grpSpPr>
+      <p:sp>
+        <p:nvSpPr>
+          <p:cNvPr id="2" name="Folienbildplatzhalter 1"/>
+          <p:cNvSpPr>
+            <a:spLocks noGrp="1" noRot="1" noChangeAspect="1"/>
+          </p:cNvSpPr>
+          <p:nvPr>
+            <p:ph type="sldImg"/>
+          </p:nvPr>
+        </p:nvSpPr>
+        <p:spPr/>
+      </p:sp>
+      <p:sp>
+        <p:nvSpPr>
+          <p:cNvPr id="3" name="Notizenplatzhalter 2"/>
+          <p:cNvSpPr>
+            <a:spLocks noGrp="1"/>
+          </p:cNvSpPr>
+          <p:nvPr>
+            <p:ph type="body" idx="1"/>
+          </p:nvPr>
+        </p:nvSpPr>
+        <p:spPr/>
+        <p:txBody>
+          <a:bodyPr/>
+          <a:lstStyle/>
+          <a:p>
+            <a:pPr marL="0" marR="0" lvl="0" indent="0" algn="l" defTabSz="914400" rtl="0" eaLnBrk="1" fontAlgn="auto" latinLnBrk="0" hangingPunct="1">
+              <a:lnSpc>
+                <a:spcPct val="100000"/>
+              </a:lnSpc>
+              <a:spcBef>
+                <a:spcPts val="0"/>
+              </a:spcBef>
+              <a:spcAft>
+                <a:spcPts val="0"/>
+              </a:spcAft>
+              <a:buClrTx/>
+              <a:buSzTx/>
+              <a:buFontTx/>
+              <a:buNone/>
+              <a:tabLst/>
+              <a:defRPr/>
+            </a:pPr>
+            <a:endParaRPr lang="en-US" b="1"/>
+          </a:p>
+        </p:txBody>
+      </p:sp>
+      <p:sp>
+        <p:nvSpPr>
+          <p:cNvPr id="4" name="Foliennummernplatzhalter 3"/>
+          <p:cNvSpPr>
+            <a:spLocks noGrp="1"/>
+          </p:cNvSpPr>
+          <p:nvPr>
+            <p:ph type="sldNum" sz="quarter" idx="10"/>
+          </p:nvPr>
+        </p:nvSpPr>
+        <p:spPr/>
+        <p:txBody>
+          <a:bodyPr/>
+          <a:lstStyle/>
+          <a:p>
+            <a:fld id="{20A41429-B750-4047-B563-2878417A70E7}" type="slidenum">
+              <a:rPr lang="en-US" smtClean="0"/>
+              <a:t>13</a:t>
             </a:fld>
             <a:endParaRPr lang="en-US"/>
           </a:p>
@@ -4193,76 +4295,6 @@
       </p:grpSpPr>
       <p:sp>
         <p:nvSpPr>
-          <p:cNvPr id="2" name="Titel 1"/>
-          <p:cNvSpPr>
-            <a:spLocks noGrp="1"/>
-          </p:cNvSpPr>
-          <p:nvPr>
-            <p:ph type="title"/>
-          </p:nvPr>
-        </p:nvSpPr>
-        <p:spPr>
-          <a:xfrm>
-            <a:off x="1066800" y="1990724"/>
-            <a:ext cx="10287000" cy="2886075"/>
-          </a:xfrm>
-        </p:spPr>
-        <p:txBody>
-          <a:bodyPr/>
-          <a:lstStyle/>
-          <a:p>
-            <a:r>
-              <a:rPr lang="en-US" b="1">
-                <a:effectLst>
-                  <a:outerShdw blurRad="38100" dist="38100" dir="2700000" algn="tl">
-                    <a:srgbClr val="000000">
-                      <a:alpha val="43137"/>
-                    </a:srgbClr>
-                  </a:outerShdw>
-                </a:effectLst>
-              </a:rPr>
-              <a:t>Part II-2: Topic Modeling</a:t>
-            </a:r>
-          </a:p>
-        </p:txBody>
-      </p:sp>
-      <p:sp>
-        <p:nvSpPr>
-          <p:cNvPr id="3" name="Textplatzhalter 2"/>
-          <p:cNvSpPr>
-            <a:spLocks noGrp="1"/>
-          </p:cNvSpPr>
-          <p:nvPr>
-            <p:ph type="body" idx="1"/>
-          </p:nvPr>
-        </p:nvSpPr>
-        <p:spPr>
-          <a:xfrm>
-            <a:off x="1066798" y="4876799"/>
-            <a:ext cx="10280651" cy="1212851"/>
-          </a:xfrm>
-        </p:spPr>
-        <p:txBody>
-          <a:bodyPr/>
-          <a:lstStyle/>
-          <a:p>
-            <a:r>
-              <a:rPr lang="en-US" b="1">
-                <a:effectLst>
-                  <a:outerShdw blurRad="38100" dist="38100" dir="2700000" algn="tl">
-                    <a:srgbClr val="000000">
-                      <a:alpha val="43137"/>
-                    </a:srgbClr>
-                  </a:outerShdw>
-                </a:effectLst>
-              </a:rPr>
-              <a:t>Keyword-Based Topic Extraction</a:t>
-            </a:r>
-          </a:p>
-        </p:txBody>
-      </p:sp>
-      <p:sp>
-        <p:nvSpPr>
           <p:cNvPr id="4" name="Foliennummernplatzhalter 3"/>
           <p:cNvSpPr>
             <a:spLocks noGrp="1"/>
@@ -4279,160 +4311,6 @@
             <a:fld id="{C9E0B00B-E6DF-4183-A694-3DE28BEFB357}" type="slidenum">
               <a:rPr lang="en-US" smtClean="0"/>
               <a:t>10</a:t>
-            </a:fld>
-            <a:endParaRPr lang="en-US"/>
-          </a:p>
-        </p:txBody>
-      </p:sp>
-    </p:spTree>
-    <p:extLst>
-      <p:ext uri="{BB962C8B-B14F-4D97-AF65-F5344CB8AC3E}">
-        <p14:creationId xmlns:p14="http://schemas.microsoft.com/office/powerpoint/2010/main" val="3502335047"/>
-      </p:ext>
-    </p:extLst>
-  </p:cSld>
-  <p:clrMapOvr>
-    <a:masterClrMapping/>
-  </p:clrMapOvr>
-</p:sld>
-</file>
-
-<file path=ppt/slides/slide11.xml><?xml version="1.0" encoding="utf-8"?>
-<p:sld xmlns:a="http://schemas.openxmlformats.org/drawingml/2006/main" xmlns:r="http://schemas.openxmlformats.org/officeDocument/2006/relationships" xmlns:p="http://schemas.openxmlformats.org/presentationml/2006/main">
-  <p:cSld>
-    <p:spTree>
-      <p:nvGrpSpPr>
-        <p:cNvPr id="1" name=""/>
-        <p:cNvGrpSpPr/>
-        <p:nvPr/>
-      </p:nvGrpSpPr>
-      <p:grpSpPr>
-        <a:xfrm>
-          <a:off x="0" y="0"/>
-          <a:ext cx="0" cy="0"/>
-          <a:chOff x="0" y="0"/>
-          <a:chExt cx="0" cy="0"/>
-        </a:xfrm>
-      </p:grpSpPr>
-      <p:sp>
-        <p:nvSpPr>
-          <p:cNvPr id="7" name="Content Placeholder 2">
-            <a:extLst>
-              <a:ext uri="{FF2B5EF4-FFF2-40B4-BE49-F238E27FC236}">
-                <a16:creationId xmlns:a16="http://schemas.microsoft.com/office/drawing/2014/main" id="{0F324A9E-9392-4545-96A6-95DE3958C6B2}"/>
-              </a:ext>
-            </a:extLst>
-          </p:cNvPr>
-          <p:cNvSpPr>
-            <a:spLocks noGrp="1"/>
-          </p:cNvSpPr>
-          <p:nvPr>
-            <p:ph idx="1"/>
-          </p:nvPr>
-        </p:nvSpPr>
-        <p:spPr>
-          <a:xfrm>
-            <a:off x="1066797" y="1990725"/>
-            <a:ext cx="10287001" cy="4457700"/>
-          </a:xfrm>
-        </p:spPr>
-        <p:txBody>
-          <a:bodyPr>
-            <a:normAutofit/>
-          </a:bodyPr>
-          <a:lstStyle/>
-          <a:p>
-            <a:r>
-              <a:rPr lang="de-DE" b="1"/>
-              <a:t>Situation:</a:t>
-            </a:r>
-          </a:p>
-          <a:p>
-            <a:pPr lvl="1"/>
-            <a:r>
-              <a:rPr lang="de-DE"/>
-              <a:t>(Statistical) topic modeling not always producing meaningful topics</a:t>
-            </a:r>
-          </a:p>
-          <a:p>
-            <a:pPr lvl="1"/>
-            <a:r>
-              <a:rPr lang="de-DE"/>
-              <a:t>Quite some human input required still</a:t>
-            </a:r>
-          </a:p>
-          <a:p>
-            <a:pPr lvl="1"/>
-            <a:r>
-              <a:rPr lang="de-DE"/>
-              <a:t>Also, unsupervised approach not always appropriate</a:t>
-            </a:r>
-          </a:p>
-          <a:p>
-            <a:r>
-              <a:rPr lang="de-DE" b="1"/>
-              <a:t>Idea: </a:t>
-            </a:r>
-            <a:r>
-              <a:rPr lang="de-DE"/>
-              <a:t>specify keywords &amp; find related documents</a:t>
-            </a:r>
-          </a:p>
-          <a:p>
-            <a:r>
-              <a:rPr lang="de-DE" b="1"/>
-              <a:t>Approach:</a:t>
-            </a:r>
-          </a:p>
-          <a:p>
-            <a:pPr lvl="1"/>
-            <a:r>
-              <a:rPr lang="de-DE"/>
-              <a:t>Specify list of keywords.</a:t>
-            </a:r>
-          </a:p>
-          <a:p>
-            <a:pPr lvl="1"/>
-            <a:r>
-              <a:rPr lang="de-DE"/>
-              <a:t>Find similar words (both morphologically &amp; semantically).</a:t>
-            </a:r>
-          </a:p>
-          <a:p>
-            <a:pPr lvl="1"/>
-            <a:r>
-              <a:rPr lang="de-DE"/>
-              <a:t>Assign all documents using these words to the associated topic.</a:t>
-            </a:r>
-          </a:p>
-          <a:p>
-            <a:pPr lvl="1"/>
-            <a:endParaRPr lang="de-DE"/>
-          </a:p>
-          <a:p>
-            <a:pPr lvl="1"/>
-            <a:endParaRPr lang="en-US"/>
-          </a:p>
-        </p:txBody>
-      </p:sp>
-      <p:sp>
-        <p:nvSpPr>
-          <p:cNvPr id="4" name="Foliennummernplatzhalter 3"/>
-          <p:cNvSpPr>
-            <a:spLocks noGrp="1"/>
-          </p:cNvSpPr>
-          <p:nvPr>
-            <p:ph type="sldNum" sz="quarter" idx="12"/>
-          </p:nvPr>
-        </p:nvSpPr>
-        <p:spPr/>
-        <p:txBody>
-          <a:bodyPr/>
-          <a:lstStyle/>
-          <a:p>
-            <a:fld id="{C9E0B00B-E6DF-4183-A694-3DE28BEFB357}" type="slidenum">
-              <a:rPr lang="en-US" smtClean="0"/>
-              <a:t>11</a:t>
             </a:fld>
             <a:endParaRPr lang="en-US"/>
           </a:p>
@@ -4466,101 +4344,11 @@
           <a:p>
             <a:r>
               <a:rPr lang="en-US"/>
-              <a:t>Keyword-Based TE  </a:t>
+              <a:t>STM  </a:t>
             </a:r>
             <a:r>
               <a:rPr lang="en-US" b="1"/>
-              <a:t>Idea</a:t>
-            </a:r>
-          </a:p>
-        </p:txBody>
-      </p:sp>
-    </p:spTree>
-    <p:extLst>
-      <p:ext uri="{BB962C8B-B14F-4D97-AF65-F5344CB8AC3E}">
-        <p14:creationId xmlns:p14="http://schemas.microsoft.com/office/powerpoint/2010/main" val="4276507552"/>
-      </p:ext>
-    </p:extLst>
-  </p:cSld>
-  <p:clrMapOvr>
-    <a:masterClrMapping/>
-  </p:clrMapOvr>
-</p:sld>
-</file>
-
-<file path=ppt/slides/slide12.xml><?xml version="1.0" encoding="utf-8"?>
-<p:sld xmlns:a="http://schemas.openxmlformats.org/drawingml/2006/main" xmlns:r="http://schemas.openxmlformats.org/officeDocument/2006/relationships" xmlns:p="http://schemas.openxmlformats.org/presentationml/2006/main">
-  <p:cSld>
-    <p:spTree>
-      <p:nvGrpSpPr>
-        <p:cNvPr id="1" name=""/>
-        <p:cNvGrpSpPr/>
-        <p:nvPr/>
-      </p:nvGrpSpPr>
-      <p:grpSpPr>
-        <a:xfrm>
-          <a:off x="0" y="0"/>
-          <a:ext cx="0" cy="0"/>
-          <a:chOff x="0" y="0"/>
-          <a:chExt cx="0" cy="0"/>
-        </a:xfrm>
-      </p:grpSpPr>
-      <p:sp>
-        <p:nvSpPr>
-          <p:cNvPr id="4" name="Foliennummernplatzhalter 3"/>
-          <p:cNvSpPr>
-            <a:spLocks noGrp="1"/>
-          </p:cNvSpPr>
-          <p:nvPr>
-            <p:ph type="sldNum" sz="quarter" idx="12"/>
-          </p:nvPr>
-        </p:nvSpPr>
-        <p:spPr/>
-        <p:txBody>
-          <a:bodyPr/>
-          <a:lstStyle/>
-          <a:p>
-            <a:fld id="{C9E0B00B-E6DF-4183-A694-3DE28BEFB357}" type="slidenum">
-              <a:rPr lang="en-US" smtClean="0"/>
-              <a:t>12</a:t>
-            </a:fld>
-            <a:endParaRPr lang="en-US"/>
-          </a:p>
-        </p:txBody>
-      </p:sp>
-      <p:sp>
-        <p:nvSpPr>
-          <p:cNvPr id="12" name="Titel 1">
-            <a:extLst>
-              <a:ext uri="{FF2B5EF4-FFF2-40B4-BE49-F238E27FC236}">
-                <a16:creationId xmlns:a16="http://schemas.microsoft.com/office/drawing/2014/main" id="{478EA67A-3C39-4D0A-996A-C363F30A14B2}"/>
-              </a:ext>
-            </a:extLst>
-          </p:cNvPr>
-          <p:cNvSpPr>
-            <a:spLocks noGrp="1"/>
-          </p:cNvSpPr>
-          <p:nvPr>
-            <p:ph type="title"/>
-          </p:nvPr>
-        </p:nvSpPr>
-        <p:spPr>
-          <a:xfrm>
-            <a:off x="1066800" y="561524"/>
-            <a:ext cx="10287000" cy="1129164"/>
-          </a:xfrm>
-        </p:spPr>
-        <p:txBody>
-          <a:bodyPr/>
-          <a:lstStyle/>
-          <a:p>
-            <a:r>
-              <a:rPr lang="en-US"/>
-              <a:t>Keyword-Based TE  </a:t>
-            </a:r>
-            <a:r>
-              <a:rPr lang="en-US" b="1"/>
-              <a:t>Approach</a:t>
+              <a:t>Exercise</a:t>
             </a:r>
           </a:p>
         </p:txBody>
@@ -4618,7 +4406,513 @@
                   <a:schemeClr val="tx1"/>
                 </a:solidFill>
               </a:rPr>
-              <a:t>Demo 7: Keyword-Based TE</a:t>
+              <a:t>Exercise 4: Analyzing Topics</a:t>
+            </a:r>
+            <a:endParaRPr lang="en-US" sz="4000" b="1">
+              <a:solidFill>
+                <a:schemeClr val="tx1"/>
+              </a:solidFill>
+            </a:endParaRPr>
+          </a:p>
+        </p:txBody>
+      </p:sp>
+      <p:pic>
+        <p:nvPicPr>
+          <p:cNvPr id="6" name="Graphic 5" descr="Game controller with solid fill">
+            <a:extLst>
+              <a:ext uri="{FF2B5EF4-FFF2-40B4-BE49-F238E27FC236}">
+                <a16:creationId xmlns:a16="http://schemas.microsoft.com/office/drawing/2014/main" id="{9AA4C070-CDB8-4FC2-A154-5F8CF4DAF93A}"/>
+              </a:ext>
+            </a:extLst>
+          </p:cNvPr>
+          <p:cNvPicPr>
+            <a:picLocks noChangeAspect="1"/>
+          </p:cNvPicPr>
+          <p:nvPr/>
+        </p:nvPicPr>
+        <p:blipFill>
+          <a:blip r:embed="rId3">
+            <a:extLst>
+              <a:ext uri="{28A0092B-C50C-407E-A947-70E740481C1C}">
+                <a14:useLocalDpi xmlns:a14="http://schemas.microsoft.com/office/drawing/2010/main" val="0"/>
+              </a:ext>
+              <a:ext uri="{96DAC541-7B7A-43D3-8B79-37D633B846F1}">
+                <asvg:svgBlip xmlns:asvg="http://schemas.microsoft.com/office/drawing/2016/SVG/main" r:embed="rId4"/>
+              </a:ext>
+            </a:extLst>
+          </a:blip>
+          <a:stretch>
+            <a:fillRect/>
+          </a:stretch>
+        </p:blipFill>
+        <p:spPr>
+          <a:xfrm>
+            <a:off x="1066800" y="2481284"/>
+            <a:ext cx="1894360" cy="1895432"/>
+          </a:xfrm>
+          <a:prstGeom prst="rect">
+            <a:avLst/>
+          </a:prstGeom>
+        </p:spPr>
+      </p:pic>
+    </p:spTree>
+    <p:extLst>
+      <p:ext uri="{BB962C8B-B14F-4D97-AF65-F5344CB8AC3E}">
+        <p14:creationId xmlns:p14="http://schemas.microsoft.com/office/powerpoint/2010/main" val="1190508300"/>
+      </p:ext>
+    </p:extLst>
+  </p:cSld>
+  <p:clrMapOvr>
+    <a:masterClrMapping/>
+  </p:clrMapOvr>
+</p:sld>
+</file>
+
+<file path=ppt/slides/slide11.xml><?xml version="1.0" encoding="utf-8"?>
+<p:sld xmlns:a="http://schemas.openxmlformats.org/drawingml/2006/main" xmlns:r="http://schemas.openxmlformats.org/officeDocument/2006/relationships" xmlns:p="http://schemas.openxmlformats.org/presentationml/2006/main">
+  <p:cSld>
+    <p:spTree>
+      <p:nvGrpSpPr>
+        <p:cNvPr id="1" name=""/>
+        <p:cNvGrpSpPr/>
+        <p:nvPr/>
+      </p:nvGrpSpPr>
+      <p:grpSpPr>
+        <a:xfrm>
+          <a:off x="0" y="0"/>
+          <a:ext cx="0" cy="0"/>
+          <a:chOff x="0" y="0"/>
+          <a:chExt cx="0" cy="0"/>
+        </a:xfrm>
+      </p:grpSpPr>
+      <p:sp>
+        <p:nvSpPr>
+          <p:cNvPr id="2" name="Titel 1"/>
+          <p:cNvSpPr>
+            <a:spLocks noGrp="1"/>
+          </p:cNvSpPr>
+          <p:nvPr>
+            <p:ph type="title"/>
+          </p:nvPr>
+        </p:nvSpPr>
+        <p:spPr>
+          <a:xfrm>
+            <a:off x="1066800" y="1990724"/>
+            <a:ext cx="10287000" cy="2886075"/>
+          </a:xfrm>
+        </p:spPr>
+        <p:txBody>
+          <a:bodyPr/>
+          <a:lstStyle/>
+          <a:p>
+            <a:r>
+              <a:rPr lang="en-US" b="1">
+                <a:effectLst>
+                  <a:outerShdw blurRad="38100" dist="38100" dir="2700000" algn="tl">
+                    <a:srgbClr val="000000">
+                      <a:alpha val="43137"/>
+                    </a:srgbClr>
+                  </a:outerShdw>
+                </a:effectLst>
+              </a:rPr>
+              <a:t>Part II-2: Topic Modeling</a:t>
+            </a:r>
+          </a:p>
+        </p:txBody>
+      </p:sp>
+      <p:sp>
+        <p:nvSpPr>
+          <p:cNvPr id="3" name="Textplatzhalter 2"/>
+          <p:cNvSpPr>
+            <a:spLocks noGrp="1"/>
+          </p:cNvSpPr>
+          <p:nvPr>
+            <p:ph type="body" idx="1"/>
+          </p:nvPr>
+        </p:nvSpPr>
+        <p:spPr>
+          <a:xfrm>
+            <a:off x="1066798" y="4876799"/>
+            <a:ext cx="10280651" cy="1212851"/>
+          </a:xfrm>
+        </p:spPr>
+        <p:txBody>
+          <a:bodyPr/>
+          <a:lstStyle/>
+          <a:p>
+            <a:r>
+              <a:rPr lang="en-US" b="1">
+                <a:effectLst>
+                  <a:outerShdw blurRad="38100" dist="38100" dir="2700000" algn="tl">
+                    <a:srgbClr val="000000">
+                      <a:alpha val="43137"/>
+                    </a:srgbClr>
+                  </a:outerShdw>
+                </a:effectLst>
+              </a:rPr>
+              <a:t>Keyword-Based Topic Extraction</a:t>
+            </a:r>
+          </a:p>
+        </p:txBody>
+      </p:sp>
+      <p:sp>
+        <p:nvSpPr>
+          <p:cNvPr id="4" name="Foliennummernplatzhalter 3"/>
+          <p:cNvSpPr>
+            <a:spLocks noGrp="1"/>
+          </p:cNvSpPr>
+          <p:nvPr>
+            <p:ph type="sldNum" sz="quarter" idx="12"/>
+          </p:nvPr>
+        </p:nvSpPr>
+        <p:spPr/>
+        <p:txBody>
+          <a:bodyPr/>
+          <a:lstStyle/>
+          <a:p>
+            <a:fld id="{C9E0B00B-E6DF-4183-A694-3DE28BEFB357}" type="slidenum">
+              <a:rPr lang="en-US" smtClean="0"/>
+              <a:t>11</a:t>
+            </a:fld>
+            <a:endParaRPr lang="en-US"/>
+          </a:p>
+        </p:txBody>
+      </p:sp>
+    </p:spTree>
+    <p:extLst>
+      <p:ext uri="{BB962C8B-B14F-4D97-AF65-F5344CB8AC3E}">
+        <p14:creationId xmlns:p14="http://schemas.microsoft.com/office/powerpoint/2010/main" val="3502335047"/>
+      </p:ext>
+    </p:extLst>
+  </p:cSld>
+  <p:clrMapOvr>
+    <a:masterClrMapping/>
+  </p:clrMapOvr>
+</p:sld>
+</file>
+
+<file path=ppt/slides/slide12.xml><?xml version="1.0" encoding="utf-8"?>
+<p:sld xmlns:a="http://schemas.openxmlformats.org/drawingml/2006/main" xmlns:r="http://schemas.openxmlformats.org/officeDocument/2006/relationships" xmlns:p="http://schemas.openxmlformats.org/presentationml/2006/main">
+  <p:cSld>
+    <p:spTree>
+      <p:nvGrpSpPr>
+        <p:cNvPr id="1" name=""/>
+        <p:cNvGrpSpPr/>
+        <p:nvPr/>
+      </p:nvGrpSpPr>
+      <p:grpSpPr>
+        <a:xfrm>
+          <a:off x="0" y="0"/>
+          <a:ext cx="0" cy="0"/>
+          <a:chOff x="0" y="0"/>
+          <a:chExt cx="0" cy="0"/>
+        </a:xfrm>
+      </p:grpSpPr>
+      <p:sp>
+        <p:nvSpPr>
+          <p:cNvPr id="7" name="Content Placeholder 2">
+            <a:extLst>
+              <a:ext uri="{FF2B5EF4-FFF2-40B4-BE49-F238E27FC236}">
+                <a16:creationId xmlns:a16="http://schemas.microsoft.com/office/drawing/2014/main" id="{0F324A9E-9392-4545-96A6-95DE3958C6B2}"/>
+              </a:ext>
+            </a:extLst>
+          </p:cNvPr>
+          <p:cNvSpPr>
+            <a:spLocks noGrp="1"/>
+          </p:cNvSpPr>
+          <p:nvPr>
+            <p:ph idx="1"/>
+          </p:nvPr>
+        </p:nvSpPr>
+        <p:spPr>
+          <a:xfrm>
+            <a:off x="1066797" y="1990725"/>
+            <a:ext cx="10287001" cy="4457700"/>
+          </a:xfrm>
+        </p:spPr>
+        <p:txBody>
+          <a:bodyPr>
+            <a:normAutofit/>
+          </a:bodyPr>
+          <a:lstStyle/>
+          <a:p>
+            <a:r>
+              <a:rPr lang="de-DE" b="1"/>
+              <a:t>Situation:</a:t>
+            </a:r>
+          </a:p>
+          <a:p>
+            <a:pPr lvl="1"/>
+            <a:r>
+              <a:rPr lang="de-DE"/>
+              <a:t>(Statistical) topic modeling not always producing meaningful topics</a:t>
+            </a:r>
+          </a:p>
+          <a:p>
+            <a:pPr lvl="1"/>
+            <a:r>
+              <a:rPr lang="de-DE"/>
+              <a:t>Quite some human input required still</a:t>
+            </a:r>
+          </a:p>
+          <a:p>
+            <a:pPr lvl="1"/>
+            <a:r>
+              <a:rPr lang="de-DE"/>
+              <a:t>Also, unsupervised approach not always appropriate</a:t>
+            </a:r>
+          </a:p>
+          <a:p>
+            <a:r>
+              <a:rPr lang="de-DE" b="1"/>
+              <a:t>Idea: </a:t>
+            </a:r>
+            <a:r>
+              <a:rPr lang="de-DE"/>
+              <a:t>specify keywords &amp; find related documents</a:t>
+            </a:r>
+          </a:p>
+          <a:p>
+            <a:r>
+              <a:rPr lang="de-DE" b="1"/>
+              <a:t>Approach:</a:t>
+            </a:r>
+          </a:p>
+          <a:p>
+            <a:pPr lvl="1"/>
+            <a:r>
+              <a:rPr lang="de-DE"/>
+              <a:t>Specify list of keywords.</a:t>
+            </a:r>
+          </a:p>
+          <a:p>
+            <a:pPr lvl="1"/>
+            <a:r>
+              <a:rPr lang="de-DE"/>
+              <a:t>Find similar words (both morphologically &amp; semantically).</a:t>
+            </a:r>
+          </a:p>
+          <a:p>
+            <a:pPr lvl="1"/>
+            <a:r>
+              <a:rPr lang="de-DE"/>
+              <a:t>Assign all documents using these words to the associated topic.</a:t>
+            </a:r>
+          </a:p>
+          <a:p>
+            <a:pPr lvl="1"/>
+            <a:endParaRPr lang="de-DE"/>
+          </a:p>
+          <a:p>
+            <a:pPr lvl="1"/>
+            <a:endParaRPr lang="en-US"/>
+          </a:p>
+        </p:txBody>
+      </p:sp>
+      <p:sp>
+        <p:nvSpPr>
+          <p:cNvPr id="4" name="Foliennummernplatzhalter 3"/>
+          <p:cNvSpPr>
+            <a:spLocks noGrp="1"/>
+          </p:cNvSpPr>
+          <p:nvPr>
+            <p:ph type="sldNum" sz="quarter" idx="12"/>
+          </p:nvPr>
+        </p:nvSpPr>
+        <p:spPr/>
+        <p:txBody>
+          <a:bodyPr/>
+          <a:lstStyle/>
+          <a:p>
+            <a:fld id="{C9E0B00B-E6DF-4183-A694-3DE28BEFB357}" type="slidenum">
+              <a:rPr lang="en-US" smtClean="0"/>
+              <a:t>12</a:t>
+            </a:fld>
+            <a:endParaRPr lang="en-US"/>
+          </a:p>
+        </p:txBody>
+      </p:sp>
+      <p:sp>
+        <p:nvSpPr>
+          <p:cNvPr id="12" name="Titel 1">
+            <a:extLst>
+              <a:ext uri="{FF2B5EF4-FFF2-40B4-BE49-F238E27FC236}">
+                <a16:creationId xmlns:a16="http://schemas.microsoft.com/office/drawing/2014/main" id="{478EA67A-3C39-4D0A-996A-C363F30A14B2}"/>
+              </a:ext>
+            </a:extLst>
+          </p:cNvPr>
+          <p:cNvSpPr>
+            <a:spLocks noGrp="1"/>
+          </p:cNvSpPr>
+          <p:nvPr>
+            <p:ph type="title"/>
+          </p:nvPr>
+        </p:nvSpPr>
+        <p:spPr>
+          <a:xfrm>
+            <a:off x="1066800" y="561524"/>
+            <a:ext cx="10287000" cy="1129164"/>
+          </a:xfrm>
+        </p:spPr>
+        <p:txBody>
+          <a:bodyPr/>
+          <a:lstStyle/>
+          <a:p>
+            <a:r>
+              <a:rPr lang="en-US"/>
+              <a:t>Keyword-Based TE  </a:t>
+            </a:r>
+            <a:r>
+              <a:rPr lang="en-US" b="1"/>
+              <a:t>Idea</a:t>
+            </a:r>
+          </a:p>
+        </p:txBody>
+      </p:sp>
+    </p:spTree>
+    <p:extLst>
+      <p:ext uri="{BB962C8B-B14F-4D97-AF65-F5344CB8AC3E}">
+        <p14:creationId xmlns:p14="http://schemas.microsoft.com/office/powerpoint/2010/main" val="4276507552"/>
+      </p:ext>
+    </p:extLst>
+  </p:cSld>
+  <p:clrMapOvr>
+    <a:masterClrMapping/>
+  </p:clrMapOvr>
+</p:sld>
+</file>
+
+<file path=ppt/slides/slide13.xml><?xml version="1.0" encoding="utf-8"?>
+<p:sld xmlns:a="http://schemas.openxmlformats.org/drawingml/2006/main" xmlns:r="http://schemas.openxmlformats.org/officeDocument/2006/relationships" xmlns:p="http://schemas.openxmlformats.org/presentationml/2006/main">
+  <p:cSld>
+    <p:spTree>
+      <p:nvGrpSpPr>
+        <p:cNvPr id="1" name=""/>
+        <p:cNvGrpSpPr/>
+        <p:nvPr/>
+      </p:nvGrpSpPr>
+      <p:grpSpPr>
+        <a:xfrm>
+          <a:off x="0" y="0"/>
+          <a:ext cx="0" cy="0"/>
+          <a:chOff x="0" y="0"/>
+          <a:chExt cx="0" cy="0"/>
+        </a:xfrm>
+      </p:grpSpPr>
+      <p:sp>
+        <p:nvSpPr>
+          <p:cNvPr id="4" name="Foliennummernplatzhalter 3"/>
+          <p:cNvSpPr>
+            <a:spLocks noGrp="1"/>
+          </p:cNvSpPr>
+          <p:nvPr>
+            <p:ph type="sldNum" sz="quarter" idx="12"/>
+          </p:nvPr>
+        </p:nvSpPr>
+        <p:spPr/>
+        <p:txBody>
+          <a:bodyPr/>
+          <a:lstStyle/>
+          <a:p>
+            <a:fld id="{C9E0B00B-E6DF-4183-A694-3DE28BEFB357}" type="slidenum">
+              <a:rPr lang="en-US" smtClean="0"/>
+              <a:t>13</a:t>
+            </a:fld>
+            <a:endParaRPr lang="en-US"/>
+          </a:p>
+        </p:txBody>
+      </p:sp>
+      <p:sp>
+        <p:nvSpPr>
+          <p:cNvPr id="12" name="Titel 1">
+            <a:extLst>
+              <a:ext uri="{FF2B5EF4-FFF2-40B4-BE49-F238E27FC236}">
+                <a16:creationId xmlns:a16="http://schemas.microsoft.com/office/drawing/2014/main" id="{478EA67A-3C39-4D0A-996A-C363F30A14B2}"/>
+              </a:ext>
+            </a:extLst>
+          </p:cNvPr>
+          <p:cNvSpPr>
+            <a:spLocks noGrp="1"/>
+          </p:cNvSpPr>
+          <p:nvPr>
+            <p:ph type="title"/>
+          </p:nvPr>
+        </p:nvSpPr>
+        <p:spPr>
+          <a:xfrm>
+            <a:off x="1066800" y="561524"/>
+            <a:ext cx="10287000" cy="1129164"/>
+          </a:xfrm>
+        </p:spPr>
+        <p:txBody>
+          <a:bodyPr/>
+          <a:lstStyle/>
+          <a:p>
+            <a:r>
+              <a:rPr lang="en-US"/>
+              <a:t>Keyword-Based TE  </a:t>
+            </a:r>
+            <a:r>
+              <a:rPr lang="en-US" b="1"/>
+              <a:t>Approach</a:t>
+            </a:r>
+          </a:p>
+        </p:txBody>
+      </p:sp>
+      <p:sp>
+        <p:nvSpPr>
+          <p:cNvPr id="7" name="Rectangle 6">
+            <a:extLst>
+              <a:ext uri="{FF2B5EF4-FFF2-40B4-BE49-F238E27FC236}">
+                <a16:creationId xmlns:a16="http://schemas.microsoft.com/office/drawing/2014/main" id="{399D5C87-EDAB-4C4B-A55D-E6DBDD9D5ABA}"/>
+              </a:ext>
+            </a:extLst>
+          </p:cNvPr>
+          <p:cNvSpPr/>
+          <p:nvPr/>
+        </p:nvSpPr>
+        <p:spPr>
+          <a:xfrm>
+            <a:off x="3228976" y="1992993"/>
+            <a:ext cx="8153400" cy="2872013"/>
+          </a:xfrm>
+          <a:prstGeom prst="rect">
+            <a:avLst/>
+          </a:prstGeom>
+          <a:solidFill>
+            <a:schemeClr val="bg2"/>
+          </a:solidFill>
+          <a:ln w="19050">
+            <a:solidFill>
+              <a:schemeClr val="bg2"/>
+            </a:solidFill>
+          </a:ln>
+        </p:spPr>
+        <p:style>
+          <a:lnRef idx="2">
+            <a:schemeClr val="dk1"/>
+          </a:lnRef>
+          <a:fillRef idx="1">
+            <a:schemeClr val="lt1"/>
+          </a:fillRef>
+          <a:effectRef idx="0">
+            <a:schemeClr val="dk1"/>
+          </a:effectRef>
+          <a:fontRef idx="minor">
+            <a:schemeClr val="dk1"/>
+          </a:fontRef>
+        </p:style>
+        <p:txBody>
+          <a:bodyPr rtlCol="0" anchor="ctr"/>
+          <a:lstStyle/>
+          <a:p>
+            <a:r>
+              <a:rPr lang="de-DE" sz="4000" b="1">
+                <a:solidFill>
+                  <a:schemeClr val="tx1"/>
+                </a:solidFill>
+              </a:rPr>
+              <a:t>Demo 8: Keyword-Based TE</a:t>
             </a:r>
             <a:endParaRPr lang="en-US" sz="4000" b="1">
               <a:solidFill>
@@ -4680,147 +4974,6 @@
 </p:sld>
 </file>
 
-<file path=ppt/slides/slide13.xml><?xml version="1.0" encoding="utf-8"?>
-<p:sld xmlns:a="http://schemas.openxmlformats.org/drawingml/2006/main" xmlns:r="http://schemas.openxmlformats.org/officeDocument/2006/relationships" xmlns:p="http://schemas.openxmlformats.org/presentationml/2006/main">
-  <p:cSld>
-    <p:spTree>
-      <p:nvGrpSpPr>
-        <p:cNvPr id="1" name=""/>
-        <p:cNvGrpSpPr/>
-        <p:nvPr/>
-      </p:nvGrpSpPr>
-      <p:grpSpPr>
-        <a:xfrm>
-          <a:off x="0" y="0"/>
-          <a:ext cx="0" cy="0"/>
-          <a:chOff x="0" y="0"/>
-          <a:chExt cx="0" cy="0"/>
-        </a:xfrm>
-      </p:grpSpPr>
-      <p:sp>
-        <p:nvSpPr>
-          <p:cNvPr id="2" name="Titel 1"/>
-          <p:cNvSpPr>
-            <a:spLocks noGrp="1"/>
-          </p:cNvSpPr>
-          <p:nvPr>
-            <p:ph type="title"/>
-          </p:nvPr>
-        </p:nvSpPr>
-        <p:spPr>
-          <a:xfrm>
-            <a:off x="1066800" y="1990724"/>
-            <a:ext cx="10287000" cy="2886075"/>
-          </a:xfrm>
-        </p:spPr>
-        <p:txBody>
-          <a:bodyPr/>
-          <a:lstStyle/>
-          <a:p>
-            <a:r>
-              <a:rPr lang="en-US" b="1">
-                <a:effectLst>
-                  <a:outerShdw blurRad="38100" dist="38100" dir="2700000" algn="tl">
-                    <a:srgbClr val="000000">
-                      <a:alpha val="43137"/>
-                    </a:srgbClr>
-                  </a:outerShdw>
-                </a:effectLst>
-              </a:rPr>
-              <a:t>Part II-2: Topic Modeling</a:t>
-            </a:r>
-            <a:endParaRPr lang="en-US">
-              <a:effectLst>
-                <a:outerShdw blurRad="38100" dist="38100" dir="2700000" algn="tl">
-                  <a:srgbClr val="000000">
-                    <a:alpha val="43137"/>
-                  </a:srgbClr>
-                </a:outerShdw>
-              </a:effectLst>
-            </a:endParaRPr>
-          </a:p>
-        </p:txBody>
-      </p:sp>
-      <p:sp>
-        <p:nvSpPr>
-          <p:cNvPr id="3" name="Textplatzhalter 2"/>
-          <p:cNvSpPr>
-            <a:spLocks noGrp="1"/>
-          </p:cNvSpPr>
-          <p:nvPr>
-            <p:ph type="body" idx="1"/>
-          </p:nvPr>
-        </p:nvSpPr>
-        <p:spPr>
-          <a:xfrm>
-            <a:off x="1066798" y="4876799"/>
-            <a:ext cx="10280651" cy="1212851"/>
-          </a:xfrm>
-        </p:spPr>
-        <p:txBody>
-          <a:bodyPr/>
-          <a:lstStyle/>
-          <a:p>
-            <a:r>
-              <a:rPr lang="en-US" b="1">
-                <a:effectLst>
-                  <a:outerShdw blurRad="38100" dist="38100" dir="2700000" algn="tl">
-                    <a:srgbClr val="000000">
-                      <a:alpha val="43137"/>
-                    </a:srgbClr>
-                  </a:outerShdw>
-                </a:effectLst>
-              </a:rPr>
-              <a:t>Literature and References</a:t>
-            </a:r>
-            <a:endParaRPr lang="en-US" b="1" dirty="0">
-              <a:effectLst>
-                <a:outerShdw blurRad="38100" dist="38100" dir="2700000" algn="tl">
-                  <a:srgbClr val="000000">
-                    <a:alpha val="43137"/>
-                  </a:srgbClr>
-                </a:outerShdw>
-              </a:effectLst>
-            </a:endParaRPr>
-          </a:p>
-        </p:txBody>
-      </p:sp>
-      <p:sp>
-        <p:nvSpPr>
-          <p:cNvPr id="4" name="Foliennummernplatzhalter 3"/>
-          <p:cNvSpPr>
-            <a:spLocks noGrp="1"/>
-          </p:cNvSpPr>
-          <p:nvPr>
-            <p:ph type="sldNum" sz="quarter" idx="12"/>
-          </p:nvPr>
-        </p:nvSpPr>
-        <p:spPr/>
-        <p:txBody>
-          <a:bodyPr/>
-          <a:lstStyle/>
-          <a:p>
-            <a:fld id="{C9E0B00B-E6DF-4183-A694-3DE28BEFB357}" type="slidenum">
-              <a:rPr lang="en-US" smtClean="0"/>
-              <a:t>13</a:t>
-            </a:fld>
-            <a:endParaRPr lang="en-US"/>
-          </a:p>
-        </p:txBody>
-      </p:sp>
-    </p:spTree>
-    <p:extLst>
-      <p:ext uri="{BB962C8B-B14F-4D97-AF65-F5344CB8AC3E}">
-        <p14:creationId xmlns:p14="http://schemas.microsoft.com/office/powerpoint/2010/main" val="3483205053"/>
-      </p:ext>
-    </p:extLst>
-  </p:cSld>
-  <p:clrMapOvr>
-    <a:masterClrMapping/>
-  </p:clrMapOvr>
-</p:sld>
-</file>
-
 <file path=ppt/slides/slide14.xml><?xml version="1.0" encoding="utf-8"?>
 <p:sld xmlns:a="http://schemas.openxmlformats.org/drawingml/2006/main" xmlns:r="http://schemas.openxmlformats.org/officeDocument/2006/relationships" xmlns:p="http://schemas.openxmlformats.org/presentationml/2006/main">
   <p:cSld>
@@ -4840,6 +4993,147 @@
       </p:grpSpPr>
       <p:sp>
         <p:nvSpPr>
+          <p:cNvPr id="2" name="Titel 1"/>
+          <p:cNvSpPr>
+            <a:spLocks noGrp="1"/>
+          </p:cNvSpPr>
+          <p:nvPr>
+            <p:ph type="title"/>
+          </p:nvPr>
+        </p:nvSpPr>
+        <p:spPr>
+          <a:xfrm>
+            <a:off x="1066800" y="1990724"/>
+            <a:ext cx="10287000" cy="2886075"/>
+          </a:xfrm>
+        </p:spPr>
+        <p:txBody>
+          <a:bodyPr/>
+          <a:lstStyle/>
+          <a:p>
+            <a:r>
+              <a:rPr lang="en-US" b="1">
+                <a:effectLst>
+                  <a:outerShdw blurRad="38100" dist="38100" dir="2700000" algn="tl">
+                    <a:srgbClr val="000000">
+                      <a:alpha val="43137"/>
+                    </a:srgbClr>
+                  </a:outerShdw>
+                </a:effectLst>
+              </a:rPr>
+              <a:t>Part II-2: Topic Modeling</a:t>
+            </a:r>
+            <a:endParaRPr lang="en-US">
+              <a:effectLst>
+                <a:outerShdw blurRad="38100" dist="38100" dir="2700000" algn="tl">
+                  <a:srgbClr val="000000">
+                    <a:alpha val="43137"/>
+                  </a:srgbClr>
+                </a:outerShdw>
+              </a:effectLst>
+            </a:endParaRPr>
+          </a:p>
+        </p:txBody>
+      </p:sp>
+      <p:sp>
+        <p:nvSpPr>
+          <p:cNvPr id="3" name="Textplatzhalter 2"/>
+          <p:cNvSpPr>
+            <a:spLocks noGrp="1"/>
+          </p:cNvSpPr>
+          <p:nvPr>
+            <p:ph type="body" idx="1"/>
+          </p:nvPr>
+        </p:nvSpPr>
+        <p:spPr>
+          <a:xfrm>
+            <a:off x="1066798" y="4876799"/>
+            <a:ext cx="10280651" cy="1212851"/>
+          </a:xfrm>
+        </p:spPr>
+        <p:txBody>
+          <a:bodyPr/>
+          <a:lstStyle/>
+          <a:p>
+            <a:r>
+              <a:rPr lang="en-US" b="1">
+                <a:effectLst>
+                  <a:outerShdw blurRad="38100" dist="38100" dir="2700000" algn="tl">
+                    <a:srgbClr val="000000">
+                      <a:alpha val="43137"/>
+                    </a:srgbClr>
+                  </a:outerShdw>
+                </a:effectLst>
+              </a:rPr>
+              <a:t>Literature and References</a:t>
+            </a:r>
+            <a:endParaRPr lang="en-US" b="1" dirty="0">
+              <a:effectLst>
+                <a:outerShdw blurRad="38100" dist="38100" dir="2700000" algn="tl">
+                  <a:srgbClr val="000000">
+                    <a:alpha val="43137"/>
+                  </a:srgbClr>
+                </a:outerShdw>
+              </a:effectLst>
+            </a:endParaRPr>
+          </a:p>
+        </p:txBody>
+      </p:sp>
+      <p:sp>
+        <p:nvSpPr>
+          <p:cNvPr id="4" name="Foliennummernplatzhalter 3"/>
+          <p:cNvSpPr>
+            <a:spLocks noGrp="1"/>
+          </p:cNvSpPr>
+          <p:nvPr>
+            <p:ph type="sldNum" sz="quarter" idx="12"/>
+          </p:nvPr>
+        </p:nvSpPr>
+        <p:spPr/>
+        <p:txBody>
+          <a:bodyPr/>
+          <a:lstStyle/>
+          <a:p>
+            <a:fld id="{C9E0B00B-E6DF-4183-A694-3DE28BEFB357}" type="slidenum">
+              <a:rPr lang="en-US" smtClean="0"/>
+              <a:t>14</a:t>
+            </a:fld>
+            <a:endParaRPr lang="en-US"/>
+          </a:p>
+        </p:txBody>
+      </p:sp>
+    </p:spTree>
+    <p:extLst>
+      <p:ext uri="{BB962C8B-B14F-4D97-AF65-F5344CB8AC3E}">
+        <p14:creationId xmlns:p14="http://schemas.microsoft.com/office/powerpoint/2010/main" val="3483205053"/>
+      </p:ext>
+    </p:extLst>
+  </p:cSld>
+  <p:clrMapOvr>
+    <a:masterClrMapping/>
+  </p:clrMapOvr>
+</p:sld>
+</file>
+
+<file path=ppt/slides/slide15.xml><?xml version="1.0" encoding="utf-8"?>
+<p:sld xmlns:a="http://schemas.openxmlformats.org/drawingml/2006/main" xmlns:r="http://schemas.openxmlformats.org/officeDocument/2006/relationships" xmlns:p="http://schemas.openxmlformats.org/presentationml/2006/main">
+  <p:cSld>
+    <p:spTree>
+      <p:nvGrpSpPr>
+        <p:cNvPr id="1" name=""/>
+        <p:cNvGrpSpPr/>
+        <p:nvPr/>
+      </p:nvGrpSpPr>
+      <p:grpSpPr>
+        <a:xfrm>
+          <a:off x="0" y="0"/>
+          <a:ext cx="0" cy="0"/>
+          <a:chOff x="0" y="0"/>
+          <a:chExt cx="0" cy="0"/>
+        </a:xfrm>
+      </p:grpSpPr>
+      <p:sp>
+        <p:nvSpPr>
           <p:cNvPr id="3" name="Inhaltsplatzhalter 2"/>
           <p:cNvSpPr>
             <a:spLocks noGrp="1"/>
@@ -4887,7 +5181,7 @@
           <a:p>
             <a:fld id="{C9E0B00B-E6DF-4183-A694-3DE28BEFB357}" type="slidenum">
               <a:rPr lang="en-US" smtClean="0"/>
-              <a:t>14</a:t>
+              <a:t>15</a:t>
             </a:fld>
             <a:endParaRPr lang="en-US"/>
           </a:p>
@@ -6500,7 +6794,7 @@
             </a:r>
             <a:r>
               <a:rPr lang="en-US" b="1"/>
-              <a:t>Exercise</a:t>
+              <a:t>Approach</a:t>
             </a:r>
           </a:p>
         </p:txBody>
@@ -6558,7 +6852,7 @@
                   <a:schemeClr val="tx1"/>
                 </a:solidFill>
               </a:rPr>
-              <a:t>Exercise 4: Analyzing Topics</a:t>
+              <a:t>Demo 7: STM</a:t>
             </a:r>
             <a:endParaRPr lang="en-US" sz="4000" b="1">
               <a:solidFill>
@@ -6570,10 +6864,10 @@
       </p:sp>
       <p:pic>
         <p:nvPicPr>
-          <p:cNvPr id="6" name="Graphic 5" descr="Game controller with solid fill">
+          <p:cNvPr id="9" name="Graphic 8" descr="Play with solid fill">
             <a:extLst>
               <a:ext uri="{FF2B5EF4-FFF2-40B4-BE49-F238E27FC236}">
-                <a16:creationId xmlns:a16="http://schemas.microsoft.com/office/drawing/2014/main" id="{9AA4C070-CDB8-4FC2-A154-5F8CF4DAF93A}"/>
+                <a16:creationId xmlns:a16="http://schemas.microsoft.com/office/drawing/2014/main" id="{5987626F-A389-40EE-AED1-4EC2BDAD023F}"/>
               </a:ext>
             </a:extLst>
           </p:cNvPr>
@@ -6599,8 +6893,8 @@
         </p:blipFill>
         <p:spPr>
           <a:xfrm>
-            <a:off x="1066800" y="2481284"/>
-            <a:ext cx="1894360" cy="1895432"/>
+            <a:off x="923914" y="2276468"/>
+            <a:ext cx="2305062" cy="2305062"/>
           </a:xfrm>
           <a:prstGeom prst="rect">
             <a:avLst/>
@@ -6610,7 +6904,7 @@
     </p:spTree>
     <p:extLst>
       <p:ext uri="{BB962C8B-B14F-4D97-AF65-F5344CB8AC3E}">
-        <p14:creationId xmlns:p14="http://schemas.microsoft.com/office/powerpoint/2010/main" val="1190508300"/>
+        <p14:creationId xmlns:p14="http://schemas.microsoft.com/office/powerpoint/2010/main" val="1491246809"/>
       </p:ext>
     </p:extLst>
   </p:cSld>

</xml_diff>

<commit_message>
finished slides on embeddings and fixed bug in emb code
</commit_message>
<xml_diff>
--- a/5_seminar/Contents_Part_02/slides/slides_II_2.pptx
+++ b/5_seminar/Contents_Part_02/slides/slides_II_2.pptx
@@ -217,7 +217,7 @@
           <a:p>
             <a:fld id="{7A5B87F2-13FD-4A24-9F19-39B31C60B536}" type="datetimeFigureOut">
               <a:rPr lang="en-US" smtClean="0"/>
-              <a:t>4/26/2021</a:t>
+              <a:t>4/28/2021</a:t>
             </a:fld>
             <a:endParaRPr lang="en-US"/>
           </a:p>
@@ -2013,7 +2013,7 @@
           <a:p>
             <a:fld id="{5A1811BA-6AD9-41A7-B7A2-456C8523519C}" type="datetime1">
               <a:rPr lang="en-US" smtClean="0"/>
-              <a:t>4/26/2021</a:t>
+              <a:t>4/28/2021</a:t>
             </a:fld>
             <a:endParaRPr lang="en-US"/>
           </a:p>
@@ -2183,7 +2183,7 @@
           <a:p>
             <a:fld id="{B0494441-C196-4BB0-93EE-AF22360207AB}" type="datetime1">
               <a:rPr lang="en-US" smtClean="0"/>
-              <a:t>4/26/2021</a:t>
+              <a:t>4/28/2021</a:t>
             </a:fld>
             <a:endParaRPr lang="en-US"/>
           </a:p>
@@ -2363,7 +2363,7 @@
           <a:p>
             <a:fld id="{D7B9282B-C3CE-4F56-8DD1-5349F982F1D2}" type="datetime1">
               <a:rPr lang="en-US" smtClean="0"/>
-              <a:t>4/26/2021</a:t>
+              <a:t>4/28/2021</a:t>
             </a:fld>
             <a:endParaRPr lang="en-US"/>
           </a:p>
@@ -2533,7 +2533,7 @@
           <a:p>
             <a:fld id="{E6E86D6A-786F-4E85-AF3B-385015383ABA}" type="datetime1">
               <a:rPr lang="en-US" smtClean="0"/>
-              <a:t>4/26/2021</a:t>
+              <a:t>4/28/2021</a:t>
             </a:fld>
             <a:endParaRPr lang="en-US"/>
           </a:p>
@@ -2779,7 +2779,7 @@
           <a:p>
             <a:fld id="{051FFEB0-9C80-4A34-A5C7-72D52D52FC7D}" type="datetime1">
               <a:rPr lang="en-US" smtClean="0"/>
-              <a:t>4/26/2021</a:t>
+              <a:t>4/28/2021</a:t>
             </a:fld>
             <a:endParaRPr lang="en-US"/>
           </a:p>
@@ -3011,7 +3011,7 @@
           <a:p>
             <a:fld id="{084267AD-C299-471B-ABA1-D0EA94C7EDCF}" type="datetime1">
               <a:rPr lang="en-US" smtClean="0"/>
-              <a:t>4/26/2021</a:t>
+              <a:t>4/28/2021</a:t>
             </a:fld>
             <a:endParaRPr lang="en-US"/>
           </a:p>
@@ -3378,7 +3378,7 @@
           <a:p>
             <a:fld id="{6468DBC7-10F8-46A1-8CE1-DBB0A6F0EF3E}" type="datetime1">
               <a:rPr lang="en-US" smtClean="0"/>
-              <a:t>4/26/2021</a:t>
+              <a:t>4/28/2021</a:t>
             </a:fld>
             <a:endParaRPr lang="en-US"/>
           </a:p>
@@ -3496,7 +3496,7 @@
           <a:p>
             <a:fld id="{0A97ED80-8DDA-43A7-A78F-B0542D691D0E}" type="datetime1">
               <a:rPr lang="en-US" smtClean="0"/>
-              <a:t>4/26/2021</a:t>
+              <a:t>4/28/2021</a:t>
             </a:fld>
             <a:endParaRPr lang="en-US"/>
           </a:p>
@@ -3591,7 +3591,7 @@
           <a:p>
             <a:fld id="{0AF827E6-45BA-40D2-98F2-BE4FFF095577}" type="datetime1">
               <a:rPr lang="en-US" smtClean="0"/>
-              <a:t>4/26/2021</a:t>
+              <a:t>4/28/2021</a:t>
             </a:fld>
             <a:endParaRPr lang="en-US"/>
           </a:p>
@@ -3868,7 +3868,7 @@
           <a:p>
             <a:fld id="{42BD114C-22EA-4B1A-A45B-ED6465C7BB4E}" type="datetime1">
               <a:rPr lang="en-US" smtClean="0"/>
-              <a:t>4/26/2021</a:t>
+              <a:t>4/28/2021</a:t>
             </a:fld>
             <a:endParaRPr lang="en-US"/>
           </a:p>
@@ -4121,7 +4121,7 @@
           <a:p>
             <a:fld id="{F46F8903-38BE-4FD8-98FC-E4EF771B2D8C}" type="datetime1">
               <a:rPr lang="en-US" smtClean="0"/>
-              <a:t>4/26/2021</a:t>
+              <a:t>4/28/2021</a:t>
             </a:fld>
             <a:endParaRPr lang="en-US"/>
           </a:p>
@@ -4334,7 +4334,7 @@
           <a:p>
             <a:fld id="{A91AC8C7-9CA9-4E83-8CE3-AD3BE4150B39}" type="datetime1">
               <a:rPr lang="en-US" smtClean="0"/>
-              <a:t>4/26/2021</a:t>
+              <a:t>4/28/2021</a:t>
             </a:fld>
             <a:endParaRPr lang="en-US"/>
           </a:p>

</xml_diff>